<commit_message>
Bug fixes & April Tag Removwal of 32 to 64
tuned sleep time for open & close claw & Bump Y function as well
</commit_message>
<xml_diff>
--- a/ProgrammingDocs/Gamepad_AT_2022_11142022.pptx
+++ b/ProgrammingDocs/Gamepad_AT_2022_11142022.pptx
@@ -247,7 +247,7 @@
       <p15:sldGuideLst xmlns:p15="http://schemas.microsoft.com/office/powerpoint/2012/main"/>
     </p:ext>
     <p:ext uri="http://customooxmlschemas.google.com/">
-      <go:slidesCustomData xmlns="" xmlns:mc="http://schemas.openxmlformats.org/markup-compatibility/2006" xmlns:mv="urn:schemas-microsoft-com:mac:vml" xmlns:c="http://schemas.openxmlformats.org/drawingml/2006/chart" xmlns:dgm="http://schemas.openxmlformats.org/drawingml/2006/diagram" xmlns:o="urn:schemas-microsoft-com:office:office" xmlns:v="urn:schemas-microsoft-com:vml" xmlns:pvml="urn:schemas-microsoft-com:office:powerpoint" xmlns:com="http://schemas.openxmlformats.org/drawingml/2006/compatibility" xmlns:p14="http://schemas.microsoft.com/office/powerpoint/2010/main" xmlns:p15="http://schemas.microsoft.com/office/powerpoint/2012/main" xmlns:ahyp="http://schemas.microsoft.com/office/drawing/2018/hyperlinkcolor" xmlns:go="http://customooxmlschemas.google.com/" r:id="rId9" roundtripDataSignature="AMtx7mg7/Uy38vozo7lv7lODiH/+yduhyA=="/>
+      <go:slidesCustomData xmlns:go="http://customooxmlschemas.google.com/" xmlns:ahyp="http://schemas.microsoft.com/office/drawing/2018/hyperlinkcolor" xmlns:p15="http://schemas.microsoft.com/office/powerpoint/2012/main" xmlns:p14="http://schemas.microsoft.com/office/powerpoint/2010/main" xmlns:com="http://schemas.openxmlformats.org/drawingml/2006/compatibility" xmlns:pvml="urn:schemas-microsoft-com:office:powerpoint" xmlns:v="urn:schemas-microsoft-com:vml" xmlns:o="urn:schemas-microsoft-com:office:office" xmlns:dgm="http://schemas.openxmlformats.org/drawingml/2006/diagram" xmlns:c="http://schemas.openxmlformats.org/drawingml/2006/chart" xmlns:mv="urn:schemas-microsoft-com:mac:vml" xmlns:mc="http://schemas.openxmlformats.org/markup-compatibility/2006" xmlns="" r:id="rId9" roundtripDataSignature="AMtx7mg7/Uy38vozo7lv7lODiH/+yduhyA=="/>
     </p:ext>
   </p:extLst>
 </p:presentation>
@@ -12689,7 +12689,7 @@
         <p:spPr>
           <a:xfrm>
             <a:off x="6152914" y="1217060"/>
-            <a:ext cx="5909723" cy="1692731"/>
+            <a:ext cx="5909723" cy="1985118"/>
           </a:xfrm>
           <a:prstGeom prst="rect">
             <a:avLst/>
@@ -12909,6 +12909,67 @@
                 <a:sym typeface="Calibri"/>
               </a:rPr>
               <a:t>Left Trigger, Right Trigger &amp; A to put robot Tophat in navigation mode</a:t>
+            </a:r>
+          </a:p>
+          <a:p>
+            <a:pPr marL="342900" indent="-342900">
+              <a:spcBef>
+                <a:spcPts val="600"/>
+              </a:spcBef>
+              <a:buClr>
+                <a:srgbClr val="00B0F0"/>
+              </a:buClr>
+              <a:buSzPts val="1600"/>
+              <a:buFont typeface="Calibri"/>
+              <a:buAutoNum type="arabicPeriod"/>
+            </a:pPr>
+            <a:r>
+              <a:rPr lang="en-US" b="0" i="0" u="none" strike="noStrike" cap="none" dirty="0">
+                <a:solidFill>
+                  <a:srgbClr val="00B0F0"/>
+                </a:solidFill>
+                <a:latin typeface="Calibri"/>
+                <a:ea typeface="Calibri"/>
+                <a:cs typeface="Calibri"/>
+                <a:sym typeface="Calibri"/>
+              </a:rPr>
+              <a:t>Left Bumper, Right Bumper &amp; B is to </a:t>
+            </a:r>
+            <a:r>
+              <a:rPr lang="en-US" b="0" i="0" u="none" strike="noStrike" cap="none" dirty="0">
+                <a:solidFill>
+                  <a:srgbClr val="FF0000"/>
+                </a:solidFill>
+                <a:latin typeface="Calibri"/>
+                <a:ea typeface="Calibri"/>
+                <a:cs typeface="Calibri"/>
+                <a:sym typeface="Calibri"/>
+              </a:rPr>
+              <a:t>turn robo</a:t>
+            </a:r>
+            <a:r>
+              <a:rPr lang="en-US" dirty="0">
+                <a:solidFill>
+                  <a:srgbClr val="FF0000"/>
+                </a:solidFill>
+                <a:latin typeface="Calibri"/>
+                <a:ea typeface="Calibri"/>
+                <a:cs typeface="Calibri"/>
+                <a:sym typeface="Calibri"/>
+              </a:rPr>
+              <a:t>t left </a:t>
+            </a:r>
+            <a:r>
+              <a:rPr lang="en-US" dirty="0">
+                <a:solidFill>
+                  <a:srgbClr val="00B0F0"/>
+                </a:solidFill>
+                <a:latin typeface="Calibri"/>
+                <a:ea typeface="Calibri"/>
+                <a:cs typeface="Calibri"/>
+                <a:sym typeface="Calibri"/>
+              </a:rPr>
+              <a:t>into 180 degrees</a:t>
             </a:r>
             <a:endParaRPr lang="en-US" dirty="0">
               <a:solidFill>

</xml_diff>

<commit_message>
Testing changes during Field Practice
Testing changes during Field Practice
</commit_message>
<xml_diff>
--- a/ProgrammingDocs/Gamepad_AT_2022_11142022.pptx
+++ b/ProgrammingDocs/Gamepad_AT_2022_11142022.pptx
@@ -247,7 +247,7 @@
       <p15:sldGuideLst xmlns:p15="http://schemas.microsoft.com/office/powerpoint/2012/main"/>
     </p:ext>
     <p:ext uri="http://customooxmlschemas.google.com/">
-      <go:slidesCustomData xmlns:go="http://customooxmlschemas.google.com/" xmlns:ahyp="http://schemas.microsoft.com/office/drawing/2018/hyperlinkcolor" xmlns:p15="http://schemas.microsoft.com/office/powerpoint/2012/main" xmlns:p14="http://schemas.microsoft.com/office/powerpoint/2010/main" xmlns:com="http://schemas.openxmlformats.org/drawingml/2006/compatibility" xmlns:pvml="urn:schemas-microsoft-com:office:powerpoint" xmlns:v="urn:schemas-microsoft-com:vml" xmlns:o="urn:schemas-microsoft-com:office:office" xmlns:dgm="http://schemas.openxmlformats.org/drawingml/2006/diagram" xmlns:c="http://schemas.openxmlformats.org/drawingml/2006/chart" xmlns:mv="urn:schemas-microsoft-com:mac:vml" xmlns:mc="http://schemas.openxmlformats.org/markup-compatibility/2006" xmlns="" r:id="rId9" roundtripDataSignature="AMtx7mg7/Uy38vozo7lv7lODiH/+yduhyA=="/>
+      <go:slidesCustomData xmlns="" xmlns:mc="http://schemas.openxmlformats.org/markup-compatibility/2006" xmlns:mv="urn:schemas-microsoft-com:mac:vml" xmlns:c="http://schemas.openxmlformats.org/drawingml/2006/chart" xmlns:dgm="http://schemas.openxmlformats.org/drawingml/2006/diagram" xmlns:o="urn:schemas-microsoft-com:office:office" xmlns:v="urn:schemas-microsoft-com:vml" xmlns:pvml="urn:schemas-microsoft-com:office:powerpoint" xmlns:com="http://schemas.openxmlformats.org/drawingml/2006/compatibility" xmlns:p14="http://schemas.microsoft.com/office/powerpoint/2010/main" xmlns:p15="http://schemas.microsoft.com/office/powerpoint/2012/main" xmlns:ahyp="http://schemas.microsoft.com/office/drawing/2018/hyperlinkcolor" xmlns:go="http://customooxmlschemas.google.com/" r:id="rId9" roundtripDataSignature="AMtx7mg7/Uy38vozo7lv7lODiH/+yduhyA=="/>
     </p:ext>
   </p:extLst>
 </p:presentation>
@@ -14552,7 +14552,7 @@
         <p:spPr>
           <a:xfrm>
             <a:off x="6615688" y="545107"/>
-            <a:ext cx="5469476" cy="6293990"/>
+            <a:ext cx="5469476" cy="5786159"/>
           </a:xfrm>
           <a:prstGeom prst="rect">
             <a:avLst/>
@@ -15106,6 +15106,93 @@
               <a:buAutoNum type="arabicPeriod"/>
             </a:pPr>
             <a:r>
+              <a:rPr lang="en-US" dirty="0">
+                <a:solidFill>
+                  <a:srgbClr val="00B0F0"/>
+                </a:solidFill>
+                <a:latin typeface="Calibri"/>
+                <a:ea typeface="Calibri"/>
+                <a:cs typeface="Calibri"/>
+                <a:sym typeface="Calibri"/>
+              </a:rPr>
+              <a:t>Left Bumper, Right Bumper &amp; B is to preset for </a:t>
+            </a:r>
+            <a:r>
+              <a:rPr lang="en-US" dirty="0">
+                <a:solidFill>
+                  <a:srgbClr val="FF0000"/>
+                </a:solidFill>
+                <a:latin typeface="Calibri"/>
+                <a:ea typeface="Calibri"/>
+                <a:cs typeface="Calibri"/>
+                <a:sym typeface="Calibri"/>
+              </a:rPr>
+              <a:t>medium junction </a:t>
+            </a:r>
+            <a:r>
+              <a:rPr lang="en-US" dirty="0">
+                <a:solidFill>
+                  <a:srgbClr val="00B0F0"/>
+                </a:solidFill>
+                <a:latin typeface="Calibri"/>
+                <a:ea typeface="Calibri"/>
+                <a:cs typeface="Calibri"/>
+                <a:sym typeface="Calibri"/>
+              </a:rPr>
+              <a:t>drop</a:t>
+            </a:r>
+          </a:p>
+        </p:txBody>
+      </p:sp>
+      <p:sp>
+        <p:nvSpPr>
+          <p:cNvPr id="2" name="Google Shape;250;p4">
+            <a:extLst>
+              <a:ext uri="{FF2B5EF4-FFF2-40B4-BE49-F238E27FC236}">
+                <a16:creationId xmlns:a16="http://schemas.microsoft.com/office/drawing/2014/main" id="{50421730-9507-7375-14A1-B9B54C507B4A}"/>
+              </a:ext>
+            </a:extLst>
+          </p:cNvPr>
+          <p:cNvSpPr txBox="1"/>
+          <p:nvPr/>
+        </p:nvSpPr>
+        <p:spPr>
+          <a:xfrm>
+            <a:off x="489795" y="4917484"/>
+            <a:ext cx="5469476" cy="1615787"/>
+          </a:xfrm>
+          <a:prstGeom prst="rect">
+            <a:avLst/>
+          </a:prstGeom>
+          <a:noFill/>
+          <a:ln w="9525" cap="flat" cmpd="sng">
+            <a:solidFill>
+              <a:srgbClr val="00B0F0"/>
+            </a:solidFill>
+            <a:prstDash val="solid"/>
+            <a:round/>
+            <a:headEnd type="none" w="sm" len="sm"/>
+            <a:tailEnd type="none" w="sm" len="sm"/>
+          </a:ln>
+        </p:spPr>
+        <p:txBody>
+          <a:bodyPr spcFirstLastPara="1" wrap="square" lIns="91425" tIns="45700" rIns="91425" bIns="45700" anchor="t" anchorCtr="0">
+            <a:spAutoFit/>
+          </a:bodyPr>
+          <a:lstStyle/>
+          <a:p>
+            <a:pPr marL="342900" indent="-342900">
+              <a:spcBef>
+                <a:spcPts val="600"/>
+              </a:spcBef>
+              <a:buClr>
+                <a:srgbClr val="00B0F0"/>
+              </a:buClr>
+              <a:buSzPts val="1400"/>
+              <a:buFont typeface="Wingdings" panose="05000000000000000000" pitchFamily="2" charset="2"/>
+              <a:buChar char="Ø"/>
+            </a:pPr>
+            <a:r>
               <a:rPr lang="en-US" b="0" i="0" u="none" strike="noStrike" cap="none" dirty="0">
                 <a:solidFill>
                   <a:srgbClr val="00B0F0"/>
@@ -15151,8 +15238,8 @@
                 <a:srgbClr val="00B0F0"/>
               </a:buClr>
               <a:buSzPts val="1400"/>
-              <a:buFont typeface="+mj-lt"/>
-              <a:buAutoNum type="arabicPeriod"/>
+              <a:buFont typeface="Wingdings" panose="05000000000000000000" pitchFamily="2" charset="2"/>
+              <a:buChar char="Ø"/>
             </a:pPr>
             <a:r>
               <a:rPr lang="en-US" b="0" i="0" u="none" strike="noStrike" cap="none" dirty="0">
@@ -15165,6 +15252,55 @@
                 <a:sym typeface="Calibri"/>
               </a:rPr>
               <a:t>Left Trigger, Right Trigger &amp; Y to drop in high junction from </a:t>
+            </a:r>
+            <a:r>
+              <a:rPr lang="en-US" b="0" i="0" u="none" strike="noStrike" cap="none" dirty="0">
+                <a:solidFill>
+                  <a:srgbClr val="FF0000"/>
+                </a:solidFill>
+                <a:latin typeface="Calibri"/>
+                <a:ea typeface="Calibri"/>
+                <a:cs typeface="Calibri"/>
+                <a:sym typeface="Calibri"/>
+              </a:rPr>
+              <a:t>substation</a:t>
+            </a:r>
+            <a:r>
+              <a:rPr lang="en-US" b="0" i="0" u="none" strike="noStrike" cap="none" dirty="0">
+                <a:solidFill>
+                  <a:srgbClr val="00B0F0"/>
+                </a:solidFill>
+                <a:latin typeface="Calibri"/>
+                <a:ea typeface="Calibri"/>
+                <a:cs typeface="Calibri"/>
+                <a:sym typeface="Calibri"/>
+              </a:rPr>
+              <a:t> continuously</a:t>
+            </a:r>
+          </a:p>
+          <a:p>
+            <a:pPr marL="342900" indent="-342900">
+              <a:spcBef>
+                <a:spcPts val="600"/>
+              </a:spcBef>
+              <a:buClr>
+                <a:srgbClr val="00B0F0"/>
+              </a:buClr>
+              <a:buSzPts val="1400"/>
+              <a:buFont typeface="Wingdings" panose="05000000000000000000" pitchFamily="2" charset="2"/>
+              <a:buChar char="Ø"/>
+            </a:pPr>
+            <a:r>
+              <a:rPr lang="en-US" b="0" i="0" u="none" strike="noStrike" cap="none" dirty="0">
+                <a:solidFill>
+                  <a:srgbClr val="00B0F0"/>
+                </a:solidFill>
+                <a:latin typeface="Calibri"/>
+                <a:ea typeface="Calibri"/>
+                <a:cs typeface="Calibri"/>
+                <a:sym typeface="Calibri"/>
+              </a:rPr>
+              <a:t>Left Trigger, Right Trigger &amp; B to drop in high junction from </a:t>
             </a:r>
             <a:r>
               <a:rPr lang="en-US" b="0" i="0" u="none" strike="noStrike" cap="none" dirty="0">

</xml_diff>